<commit_message>
Update slide, báo cáo!
</commit_message>
<xml_diff>
--- a/Slide.pptx
+++ b/Slide.pptx
@@ -220,7 +220,7 @@
           <a:p>
             <a:fld id="{636539AC-B433-4144-BF82-571F8E79E096}" type="datetimeFigureOut">
               <a:rPr lang="en-US" smtClean="0"/>
-              <a:t>7/12/2015</a:t>
+              <a:t>9/12/2015</a:t>
             </a:fld>
             <a:endParaRPr lang="en-US"/>
           </a:p>
@@ -3133,7 +3133,7 @@
           <a:p>
             <a:fld id="{4AAD347D-5ACD-4C99-B74B-A9C85AD731AF}" type="datetimeFigureOut">
               <a:rPr lang="en-US" dirty="0"/>
-              <a:t>7/12/2015</a:t>
+              <a:t>9/12/2015</a:t>
             </a:fld>
             <a:endParaRPr lang="en-US" dirty="0"/>
           </a:p>
@@ -3403,7 +3403,7 @@
           <a:p>
             <a:fld id="{4509A250-FF31-4206-8172-F9D3106AACB1}" type="datetimeFigureOut">
               <a:rPr lang="en-US" dirty="0"/>
-              <a:t>7/12/2015</a:t>
+              <a:t>9/12/2015</a:t>
             </a:fld>
             <a:endParaRPr lang="en-US" dirty="0"/>
           </a:p>
@@ -3592,7 +3592,7 @@
           <a:p>
             <a:fld id="{4509A250-FF31-4206-8172-F9D3106AACB1}" type="datetimeFigureOut">
               <a:rPr lang="en-US" dirty="0"/>
-              <a:t>7/12/2015</a:t>
+              <a:t>9/12/2015</a:t>
             </a:fld>
             <a:endParaRPr lang="en-US" dirty="0"/>
           </a:p>
@@ -3860,7 +3860,7 @@
           <a:p>
             <a:fld id="{4509A250-FF31-4206-8172-F9D3106AACB1}" type="datetimeFigureOut">
               <a:rPr lang="en-US" dirty="0"/>
-              <a:t>7/12/2015</a:t>
+              <a:t>9/12/2015</a:t>
             </a:fld>
             <a:endParaRPr lang="en-US" dirty="0"/>
           </a:p>
@@ -4196,7 +4196,7 @@
           <a:p>
             <a:fld id="{4509A250-FF31-4206-8172-F9D3106AACB1}" type="datetimeFigureOut">
               <a:rPr lang="en-US" dirty="0"/>
-              <a:t>7/12/2015</a:t>
+              <a:t>9/12/2015</a:t>
             </a:fld>
             <a:endParaRPr lang="en-US" dirty="0"/>
           </a:p>
@@ -4814,7 +4814,7 @@
           <a:p>
             <a:fld id="{4509A250-FF31-4206-8172-F9D3106AACB1}" type="datetimeFigureOut">
               <a:rPr lang="en-US" dirty="0"/>
-              <a:t>7/12/2015</a:t>
+              <a:t>9/12/2015</a:t>
             </a:fld>
             <a:endParaRPr lang="en-US" dirty="0"/>
           </a:p>
@@ -5669,7 +5669,7 @@
           <a:p>
             <a:fld id="{4509A250-FF31-4206-8172-F9D3106AACB1}" type="datetimeFigureOut">
               <a:rPr lang="en-US" dirty="0"/>
-              <a:t>7/12/2015</a:t>
+              <a:t>9/12/2015</a:t>
             </a:fld>
             <a:endParaRPr lang="en-US" dirty="0"/>
           </a:p>
@@ -5834,7 +5834,7 @@
           <a:p>
             <a:fld id="{4509A250-FF31-4206-8172-F9D3106AACB1}" type="datetimeFigureOut">
               <a:rPr lang="en-US" dirty="0"/>
-              <a:t>7/12/2015</a:t>
+              <a:t>9/12/2015</a:t>
             </a:fld>
             <a:endParaRPr lang="en-US" dirty="0"/>
           </a:p>
@@ -6009,7 +6009,7 @@
           <a:p>
             <a:fld id="{4509A250-FF31-4206-8172-F9D3106AACB1}" type="datetimeFigureOut">
               <a:rPr lang="en-US" dirty="0"/>
-              <a:t>7/12/2015</a:t>
+              <a:t>9/12/2015</a:t>
             </a:fld>
             <a:endParaRPr lang="en-US" dirty="0"/>
           </a:p>
@@ -6174,7 +6174,7 @@
           <a:p>
             <a:fld id="{4509A250-FF31-4206-8172-F9D3106AACB1}" type="datetimeFigureOut">
               <a:rPr lang="en-US" dirty="0"/>
-              <a:t>7/12/2015</a:t>
+              <a:t>9/12/2015</a:t>
             </a:fld>
             <a:endParaRPr lang="en-US" dirty="0"/>
           </a:p>
@@ -6416,7 +6416,7 @@
           <a:p>
             <a:fld id="{9796027F-7875-4030-9381-8BD8C4F21935}" type="datetimeFigureOut">
               <a:rPr lang="en-US" dirty="0"/>
-              <a:t>7/12/2015</a:t>
+              <a:t>9/12/2015</a:t>
             </a:fld>
             <a:endParaRPr lang="en-US" dirty="0"/>
           </a:p>
@@ -6703,7 +6703,7 @@
           <a:p>
             <a:fld id="{9796027F-7875-4030-9381-8BD8C4F21935}" type="datetimeFigureOut">
               <a:rPr lang="en-US" dirty="0"/>
-              <a:t>7/12/2015</a:t>
+              <a:t>9/12/2015</a:t>
             </a:fld>
             <a:endParaRPr lang="en-US" dirty="0"/>
           </a:p>
@@ -7142,7 +7142,7 @@
           <a:p>
             <a:fld id="{9796027F-7875-4030-9381-8BD8C4F21935}" type="datetimeFigureOut">
               <a:rPr lang="en-US" dirty="0"/>
-              <a:t>7/12/2015</a:t>
+              <a:t>9/12/2015</a:t>
             </a:fld>
             <a:endParaRPr lang="en-US" dirty="0"/>
           </a:p>
@@ -7255,7 +7255,7 @@
           <a:p>
             <a:fld id="{4509A250-FF31-4206-8172-F9D3106AACB1}" type="datetimeFigureOut">
               <a:rPr lang="en-US" dirty="0"/>
-              <a:t>7/12/2015</a:t>
+              <a:t>9/12/2015</a:t>
             </a:fld>
             <a:endParaRPr lang="en-US" dirty="0"/>
           </a:p>
@@ -7345,7 +7345,7 @@
           <a:p>
             <a:fld id="{4509A250-FF31-4206-8172-F9D3106AACB1}" type="datetimeFigureOut">
               <a:rPr lang="en-US" dirty="0"/>
-              <a:t>7/12/2015</a:t>
+              <a:t>9/12/2015</a:t>
             </a:fld>
             <a:endParaRPr lang="en-US" dirty="0"/>
           </a:p>
@@ -7619,7 +7619,7 @@
           <a:p>
             <a:fld id="{4509A250-FF31-4206-8172-F9D3106AACB1}" type="datetimeFigureOut">
               <a:rPr lang="en-US" dirty="0"/>
-              <a:t>7/12/2015</a:t>
+              <a:t>9/12/2015</a:t>
             </a:fld>
             <a:endParaRPr lang="en-US" dirty="0"/>
           </a:p>
@@ -7889,7 +7889,7 @@
           <a:p>
             <a:fld id="{4509A250-FF31-4206-8172-F9D3106AACB1}" type="datetimeFigureOut">
               <a:rPr lang="en-US" dirty="0"/>
-              <a:t>7/12/2015</a:t>
+              <a:t>9/12/2015</a:t>
             </a:fld>
             <a:endParaRPr lang="en-US" dirty="0"/>
           </a:p>
@@ -8313,7 +8313,7 @@
           <a:p>
             <a:fld id="{4AAD347D-5ACD-4C99-B74B-A9C85AD731AF}" type="datetimeFigureOut">
               <a:rPr lang="en-US" dirty="0"/>
-              <a:t>7/12/2015</a:t>
+              <a:t>9/12/2015</a:t>
             </a:fld>
             <a:endParaRPr lang="en-US" dirty="0"/>
           </a:p>
@@ -10899,13 +10899,7 @@
               <a:rPr lang="en-US" smtClean="0">
                 <a:latin typeface="Palatino Linotype" panose="02040502050505030304" pitchFamily="18" charset="0"/>
               </a:rPr>
-              <a:t>Phần giao diện </a:t>
-            </a:r>
-            <a:r>
-              <a:rPr lang="en-US" smtClean="0">
-                <a:latin typeface="Palatino Linotype" panose="02040502050505030304" pitchFamily="18" charset="0"/>
-              </a:rPr>
-              <a:t>chọn các chứn năng quản lý.</a:t>
+              <a:t>Phần giao diện chọn các chứn năng quản lý.</a:t>
             </a:r>
             <a:endParaRPr lang="en-US">
               <a:latin typeface="Palatino Linotype" panose="02040502050505030304" pitchFamily="18" charset="0"/>
@@ -11792,7 +11786,13 @@
               <a:rPr lang="en-US" sz="2400" smtClean="0">
                 <a:latin typeface="Palatino Linotype" panose="02040502050505030304" pitchFamily="18" charset="0"/>
               </a:rPr>
-              <a:t>Phát triển thêm chức năng để người mua cũng có thể xem sản phẩm.</a:t>
+              <a:t>Phát triển thêm chức năng để người mua cũng có thể xem sản phẩm</a:t>
+            </a:r>
+            <a:r>
+              <a:rPr lang="en-US" sz="2400" smtClean="0">
+                <a:latin typeface="Palatino Linotype" panose="02040502050505030304" pitchFamily="18" charset="0"/>
+              </a:rPr>
+              <a:t>.</a:t>
             </a:r>
           </a:p>
           <a:p>
@@ -11800,6 +11800,12 @@
               <a:buFont typeface="Wingdings" panose="05000000000000000000" pitchFamily="2" charset="2"/>
               <a:buChar char="v"/>
             </a:pPr>
+            <a:r>
+              <a:rPr lang="en-US" sz="2400" smtClean="0">
+                <a:latin typeface="Palatino Linotype" panose="02040502050505030304" pitchFamily="18" charset="0"/>
+              </a:rPr>
+              <a:t>Phát triển ứng dụng thu ngân trên các nền tảng di động.</a:t>
+            </a:r>
             <a:endParaRPr lang="en-US" sz="2400" smtClean="0">
               <a:latin typeface="Palatino Linotype" panose="02040502050505030304" pitchFamily="18" charset="0"/>
             </a:endParaRPr>

</xml_diff>